<commit_message>
update the pptx and vedioe
</commit_message>
<xml_diff>
--- a/EventShare_Part3.pptx
+++ b/EventShare_Part3.pptx
@@ -13,9 +13,9 @@
     <p:sldId id="258" r:id="rId4"/>
     <p:sldId id="286" r:id="rId5"/>
     <p:sldId id="287" r:id="rId6"/>
-    <p:sldId id="289" r:id="rId7"/>
-    <p:sldId id="290" r:id="rId8"/>
-    <p:sldId id="292" r:id="rId9"/>
+    <p:sldId id="290" r:id="rId7"/>
+    <p:sldId id="292" r:id="rId8"/>
+    <p:sldId id="293" r:id="rId9"/>
     <p:sldId id="291" r:id="rId10"/>
     <p:sldId id="288" r:id="rId11"/>
   </p:sldIdLst>
@@ -549,6 +549,90 @@
           <a:p>
             <a:fld id="{6EF9999D-3598-4858-A7D6-649B11162B94}" type="slidenum">
               <a:rPr lang="zh-CN" altLang="en-US" smtClean="0"/>
+              <a:t>5</a:t>
+            </a:fld>
+            <a:endParaRPr lang="zh-CN" altLang="en-US"/>
+          </a:p>
+        </p:txBody>
+      </p:sp>
+    </p:spTree>
+    <p:extLst>
+      <p:ext uri="{BB962C8B-B14F-4D97-AF65-F5344CB8AC3E}">
+        <p14:creationId xmlns:p14="http://schemas.microsoft.com/office/powerpoint/2010/main" val="1633142491"/>
+      </p:ext>
+    </p:extLst>
+  </p:cSld>
+  <p:clrMapOvr>
+    <a:masterClrMapping/>
+  </p:clrMapOvr>
+</p:notes>
+</file>
+
+<file path=ppt/notesSlides/notesSlide2.xml><?xml version="1.0" encoding="utf-8"?>
+<p:notes xmlns:a="http://schemas.openxmlformats.org/drawingml/2006/main" xmlns:r="http://schemas.openxmlformats.org/officeDocument/2006/relationships" xmlns:p="http://schemas.openxmlformats.org/presentationml/2006/main">
+  <p:cSld>
+    <p:spTree>
+      <p:nvGrpSpPr>
+        <p:cNvPr id="1" name=""/>
+        <p:cNvGrpSpPr/>
+        <p:nvPr/>
+      </p:nvGrpSpPr>
+      <p:grpSpPr>
+        <a:xfrm>
+          <a:off x="0" y="0"/>
+          <a:ext cx="0" cy="0"/>
+          <a:chOff x="0" y="0"/>
+          <a:chExt cx="0" cy="0"/>
+        </a:xfrm>
+      </p:grpSpPr>
+      <p:sp>
+        <p:nvSpPr>
+          <p:cNvPr id="2" name="幻灯片图像占位符 1"/>
+          <p:cNvSpPr>
+            <a:spLocks noGrp="1" noRot="1" noChangeAspect="1"/>
+          </p:cNvSpPr>
+          <p:nvPr>
+            <p:ph type="sldImg"/>
+          </p:nvPr>
+        </p:nvSpPr>
+        <p:spPr/>
+      </p:sp>
+      <p:sp>
+        <p:nvSpPr>
+          <p:cNvPr id="3" name="备注占位符 2"/>
+          <p:cNvSpPr>
+            <a:spLocks noGrp="1"/>
+          </p:cNvSpPr>
+          <p:nvPr>
+            <p:ph type="body" idx="1"/>
+          </p:nvPr>
+        </p:nvSpPr>
+        <p:spPr/>
+        <p:txBody>
+          <a:bodyPr/>
+          <a:lstStyle/>
+          <a:p>
+            <a:endParaRPr lang="zh-CN" altLang="en-US"/>
+          </a:p>
+        </p:txBody>
+      </p:sp>
+      <p:sp>
+        <p:nvSpPr>
+          <p:cNvPr id="4" name="灯片编号占位符 3"/>
+          <p:cNvSpPr>
+            <a:spLocks noGrp="1"/>
+          </p:cNvSpPr>
+          <p:nvPr>
+            <p:ph type="sldNum" sz="quarter" idx="10"/>
+          </p:nvPr>
+        </p:nvSpPr>
+        <p:spPr/>
+        <p:txBody>
+          <a:bodyPr/>
+          <a:lstStyle/>
+          <a:p>
+            <a:fld id="{6EF9999D-3598-4858-A7D6-649B11162B94}" type="slidenum">
+              <a:rPr lang="zh-CN" altLang="en-US" smtClean="0"/>
               <a:t>6</a:t>
             </a:fld>
             <a:endParaRPr lang="zh-CN" altLang="en-US"/>
@@ -558,7 +642,91 @@
     </p:spTree>
     <p:extLst>
       <p:ext uri="{BB962C8B-B14F-4D97-AF65-F5344CB8AC3E}">
-        <p14:creationId xmlns:p14="http://schemas.microsoft.com/office/powerpoint/2010/main" val="1633142491"/>
+        <p14:creationId xmlns:p14="http://schemas.microsoft.com/office/powerpoint/2010/main" val="2226976178"/>
+      </p:ext>
+    </p:extLst>
+  </p:cSld>
+  <p:clrMapOvr>
+    <a:masterClrMapping/>
+  </p:clrMapOvr>
+</p:notes>
+</file>
+
+<file path=ppt/notesSlides/notesSlide3.xml><?xml version="1.0" encoding="utf-8"?>
+<p:notes xmlns:a="http://schemas.openxmlformats.org/drawingml/2006/main" xmlns:r="http://schemas.openxmlformats.org/officeDocument/2006/relationships" xmlns:p="http://schemas.openxmlformats.org/presentationml/2006/main">
+  <p:cSld>
+    <p:spTree>
+      <p:nvGrpSpPr>
+        <p:cNvPr id="1" name=""/>
+        <p:cNvGrpSpPr/>
+        <p:nvPr/>
+      </p:nvGrpSpPr>
+      <p:grpSpPr>
+        <a:xfrm>
+          <a:off x="0" y="0"/>
+          <a:ext cx="0" cy="0"/>
+          <a:chOff x="0" y="0"/>
+          <a:chExt cx="0" cy="0"/>
+        </a:xfrm>
+      </p:grpSpPr>
+      <p:sp>
+        <p:nvSpPr>
+          <p:cNvPr id="2" name="幻灯片图像占位符 1"/>
+          <p:cNvSpPr>
+            <a:spLocks noGrp="1" noRot="1" noChangeAspect="1"/>
+          </p:cNvSpPr>
+          <p:nvPr>
+            <p:ph type="sldImg"/>
+          </p:nvPr>
+        </p:nvSpPr>
+        <p:spPr/>
+      </p:sp>
+      <p:sp>
+        <p:nvSpPr>
+          <p:cNvPr id="3" name="备注占位符 2"/>
+          <p:cNvSpPr>
+            <a:spLocks noGrp="1"/>
+          </p:cNvSpPr>
+          <p:nvPr>
+            <p:ph type="body" idx="1"/>
+          </p:nvPr>
+        </p:nvSpPr>
+        <p:spPr/>
+        <p:txBody>
+          <a:bodyPr/>
+          <a:lstStyle/>
+          <a:p>
+            <a:endParaRPr lang="zh-CN" altLang="en-US"/>
+          </a:p>
+        </p:txBody>
+      </p:sp>
+      <p:sp>
+        <p:nvSpPr>
+          <p:cNvPr id="4" name="灯片编号占位符 3"/>
+          <p:cNvSpPr>
+            <a:spLocks noGrp="1"/>
+          </p:cNvSpPr>
+          <p:nvPr>
+            <p:ph type="sldNum" sz="quarter" idx="10"/>
+          </p:nvPr>
+        </p:nvSpPr>
+        <p:spPr/>
+        <p:txBody>
+          <a:bodyPr/>
+          <a:lstStyle/>
+          <a:p>
+            <a:fld id="{6EF9999D-3598-4858-A7D6-649B11162B94}" type="slidenum">
+              <a:rPr lang="zh-CN" altLang="en-US" smtClean="0"/>
+              <a:t>7</a:t>
+            </a:fld>
+            <a:endParaRPr lang="zh-CN" altLang="en-US"/>
+          </a:p>
+        </p:txBody>
+      </p:sp>
+    </p:spTree>
+    <p:extLst>
+      <p:ext uri="{BB962C8B-B14F-4D97-AF65-F5344CB8AC3E}">
+        <p14:creationId xmlns:p14="http://schemas.microsoft.com/office/powerpoint/2010/main" val="1241145694"/>
       </p:ext>
     </p:extLst>
   </p:cSld>
@@ -13755,8 +13923,8 @@
         </p:nvSpPr>
         <p:spPr>
           <a:xfrm>
-            <a:off x="954875" y="1607133"/>
-            <a:ext cx="2822119" cy="3108543"/>
+            <a:off x="1034005" y="1391690"/>
+            <a:ext cx="3017236" cy="3539430"/>
           </a:xfrm>
           <a:prstGeom prst="rect">
             <a:avLst/>
@@ -13842,8 +14010,23 @@
             </a:r>
             <a:r>
               <a:rPr lang="en-US" sz="2800" dirty="0"/>
-              <a:t> Database</a:t>
-            </a:r>
+              <a:t> </a:t>
+            </a:r>
+            <a:r>
+              <a:rPr lang="en-US" sz="2800" dirty="0" smtClean="0"/>
+              <a:t>Database</a:t>
+            </a:r>
+          </a:p>
+          <a:p>
+            <a:pPr marL="285750" indent="-285750" fontAlgn="base">
+              <a:buFont typeface="Wingdings" charset="2"/>
+              <a:buChar char="v"/>
+            </a:pPr>
+            <a:r>
+              <a:rPr lang="en-US" sz="2800" dirty="0" err="1" smtClean="0"/>
+              <a:t>Redis</a:t>
+            </a:r>
+            <a:endParaRPr lang="en-US" sz="2800" dirty="0"/>
           </a:p>
         </p:txBody>
       </p:sp>
@@ -14040,120 +14223,6 @@
 </file>
 
 <file path=ppt/slides/slide5.xml><?xml version="1.0" encoding="utf-8"?>
-<p:sld xmlns:a="http://schemas.openxmlformats.org/drawingml/2006/main" xmlns:r="http://schemas.openxmlformats.org/officeDocument/2006/relationships" xmlns:p="http://schemas.openxmlformats.org/presentationml/2006/main">
-  <p:cSld>
-    <p:spTree>
-      <p:nvGrpSpPr>
-        <p:cNvPr id="1" name=""/>
-        <p:cNvGrpSpPr/>
-        <p:nvPr/>
-      </p:nvGrpSpPr>
-      <p:grpSpPr>
-        <a:xfrm>
-          <a:off x="0" y="0"/>
-          <a:ext cx="0" cy="0"/>
-          <a:chOff x="0" y="0"/>
-          <a:chExt cx="0" cy="0"/>
-        </a:xfrm>
-      </p:grpSpPr>
-      <p:sp>
-        <p:nvSpPr>
-          <p:cNvPr id="2" name="文本占位符 1"/>
-          <p:cNvSpPr>
-            <a:spLocks noGrp="1"/>
-          </p:cNvSpPr>
-          <p:nvPr>
-            <p:ph type="body" sz="quarter" idx="10"/>
-          </p:nvPr>
-        </p:nvSpPr>
-        <p:spPr>
-          <a:xfrm>
-            <a:off x="418245" y="232368"/>
-            <a:ext cx="5232209" cy="573404"/>
-          </a:xfrm>
-        </p:spPr>
-        <p:txBody>
-          <a:bodyPr/>
-          <a:lstStyle/>
-          <a:p>
-            <a:r>
-              <a:rPr lang="en-US" b="0" dirty="0"/>
-              <a:t>Architectural </a:t>
-            </a:r>
-            <a:r>
-              <a:rPr lang="en-US" b="0" dirty="0" smtClean="0"/>
-              <a:t>Pattern </a:t>
-            </a:r>
-            <a:endParaRPr kumimoji="1" lang="zh-CN" altLang="en-US" dirty="0"/>
-          </a:p>
-        </p:txBody>
-      </p:sp>
-      <p:sp>
-        <p:nvSpPr>
-          <p:cNvPr id="15" name="矩形 14"/>
-          <p:cNvSpPr/>
-          <p:nvPr/>
-        </p:nvSpPr>
-        <p:spPr>
-          <a:xfrm>
-            <a:off x="617220" y="1211961"/>
-            <a:ext cx="4162358" cy="830997"/>
-          </a:xfrm>
-          <a:prstGeom prst="rect">
-            <a:avLst/>
-          </a:prstGeom>
-        </p:spPr>
-        <p:txBody>
-          <a:bodyPr wrap="square">
-            <a:spAutoFit/>
-          </a:bodyPr>
-          <a:lstStyle/>
-          <a:p>
-            <a:r>
-              <a:rPr lang="en-US" sz="2400" dirty="0"/>
-              <a:t>Model View Controller (MVC), REST </a:t>
-            </a:r>
-            <a:r>
-              <a:rPr lang="en-US" sz="2400" dirty="0" smtClean="0"/>
-              <a:t>API</a:t>
-            </a:r>
-            <a:endParaRPr lang="en-US" sz="2400" dirty="0"/>
-          </a:p>
-        </p:txBody>
-      </p:sp>
-    </p:spTree>
-    <p:extLst>
-      <p:ext uri="{BB962C8B-B14F-4D97-AF65-F5344CB8AC3E}">
-        <p14:creationId xmlns:p14="http://schemas.microsoft.com/office/powerpoint/2010/main" val="1375349910"/>
-      </p:ext>
-    </p:extLst>
-  </p:cSld>
-  <p:clrMapOvr>
-    <a:masterClrMapping/>
-  </p:clrMapOvr>
-  <mc:AlternateContent xmlns:mc="http://schemas.openxmlformats.org/markup-compatibility/2006" xmlns:p14="http://schemas.microsoft.com/office/powerpoint/2010/main">
-    <mc:Choice Requires="p14">
-      <p:transition spd="med" p14:dur="700">
-        <p:fade/>
-      </p:transition>
-    </mc:Choice>
-    <mc:Fallback xmlns="">
-      <p:transition spd="med">
-        <p:fade/>
-      </p:transition>
-    </mc:Fallback>
-  </mc:AlternateContent>
-  <p:timing>
-    <p:tnLst>
-      <p:par>
-        <p:cTn id="1" dur="indefinite" restart="never" nodeType="tmRoot"/>
-      </p:par>
-    </p:tnLst>
-  </p:timing>
-</p:sld>
-</file>
-
-<file path=ppt/slides/slide6.xml><?xml version="1.0" encoding="utf-8"?>
 <p:sld xmlns:a="http://schemas.openxmlformats.org/drawingml/2006/main" xmlns:r="http://schemas.openxmlformats.org/officeDocument/2006/relationships" xmlns:p="http://schemas.openxmlformats.org/presentationml/2006/main">
   <p:cSld>
     <p:spTree>
@@ -14699,7 +14768,7 @@
           <p:spPr>
             <a:xfrm>
               <a:off x="1564690" y="4630927"/>
-              <a:ext cx="2576081" cy="953903"/>
+              <a:ext cx="2360287" cy="953903"/>
             </a:xfrm>
             <a:prstGeom prst="rect">
               <a:avLst/>
@@ -14900,7 +14969,7 @@
                     <a:schemeClr val="bg1"/>
                   </a:solidFill>
                 </a:rPr>
-                <a:t>Singleton pattern is used in the design of logger classes. This classes are implemented as a singletons, and provides a global logging access point in all the application components without being necessary to create an object each time a logging operations is performed.</a:t>
+                <a:t>Singleton pattern is used in the design of logger classes. </a:t>
               </a:r>
             </a:p>
           </p:txBody>
@@ -15387,7 +15456,7 @@
                     <a:schemeClr val="bg1"/>
                   </a:solidFill>
                 </a:rPr>
-                <a:t>The view objects in an application are actually a composite of nested views that work together in a coordinated fashion. These display components range from a window to compound views, such as a table view, to individual views, such as buttons. User input and display can take place at any level of the composite structure.</a:t>
+                <a:t>The view objects in an application are actually a composite of nested views that work together in a coordinated fashion. </a:t>
               </a:r>
             </a:p>
           </p:txBody>
@@ -15591,14 +15660,14 @@
             </a:lstStyle>
             <a:p>
               <a:r>
-                <a:rPr lang="en-US" sz="2800" dirty="0" smtClean="0">
+                <a:rPr lang="en-US" sz="2800" b="1" dirty="0" smtClean="0">
                   <a:solidFill>
                     <a:schemeClr val="bg1"/>
                   </a:solidFill>
                 </a:rPr>
                 <a:t>Composite</a:t>
               </a:r>
-              <a:endParaRPr lang="en-US" sz="2800" dirty="0">
+              <a:endParaRPr lang="en-US" sz="2800" b="1" dirty="0">
                 <a:solidFill>
                   <a:schemeClr val="bg1"/>
                 </a:solidFill>
@@ -15680,7 +15749,7 @@
           </p:nvSpPr>
           <p:spPr>
             <a:xfrm>
-              <a:off x="1564690" y="4663862"/>
+              <a:off x="1531992" y="4608024"/>
               <a:ext cx="2576081" cy="903240"/>
             </a:xfrm>
             <a:prstGeom prst="rect">
@@ -15874,7 +15943,23 @@
                     <a:schemeClr val="bg1"/>
                   </a:solidFill>
                 </a:rPr>
-                <a:t>A controller object implements the strategy for one or more view objects. The view object confines itself to maintaining its visual aspects, and it delegates to the controller all decisions about the application-specific meaning of the interface behavior.</a:t>
+                <a:t>A controller object implements the strategy for one or more view objects</a:t>
+              </a:r>
+              <a:r>
+                <a:rPr lang="en-US" sz="1400" dirty="0" smtClean="0">
+                  <a:solidFill>
+                    <a:schemeClr val="bg1"/>
+                  </a:solidFill>
+                </a:rPr>
+                <a:t>. And </a:t>
+              </a:r>
+              <a:r>
+                <a:rPr lang="en-US" sz="1400" dirty="0">
+                  <a:solidFill>
+                    <a:schemeClr val="bg1"/>
+                  </a:solidFill>
+                </a:rPr>
+                <a:t>it delegates to the controller all decisions about the application-specific meaning of the interface behavior.</a:t>
               </a:r>
             </a:p>
           </p:txBody>
@@ -15889,7 +15974,7 @@
           </p:nvSpPr>
           <p:spPr>
             <a:xfrm>
-              <a:off x="1564690" y="4286301"/>
+              <a:off x="1531992" y="4235638"/>
               <a:ext cx="2788648" cy="377562"/>
             </a:xfrm>
             <a:prstGeom prst="rect">
@@ -16078,14 +16163,14 @@
             </a:lstStyle>
             <a:p>
               <a:r>
-                <a:rPr lang="en-US" sz="2800" dirty="0" smtClean="0">
+                <a:rPr lang="en-US" sz="2800" b="1" dirty="0" smtClean="0">
                   <a:solidFill>
                     <a:schemeClr val="bg1"/>
                   </a:solidFill>
                 </a:rPr>
                 <a:t>Strategy</a:t>
               </a:r>
-              <a:endParaRPr lang="en-US" sz="2800" dirty="0">
+              <a:endParaRPr lang="en-US" sz="2800" b="1" dirty="0">
                 <a:solidFill>
                   <a:schemeClr val="bg1"/>
                 </a:solidFill>
@@ -16167,7 +16252,7 @@
           </p:nvSpPr>
           <p:spPr>
             <a:xfrm>
-              <a:off x="1564690" y="4663862"/>
+              <a:off x="1554762" y="4567276"/>
               <a:ext cx="2576081" cy="903240"/>
             </a:xfrm>
             <a:prstGeom prst="rect">
@@ -16361,8 +16446,21 @@
                     <a:schemeClr val="bg1"/>
                   </a:solidFill>
                 </a:rPr>
-                <a:t>The observer pattern allows models and views to be bound to each other. A separate mechanism is needed to bind a controller to one or more models. A controller can provide a setter method for doing so, and it or some other object can call this method. </a:t>
+                <a:t>The observer pattern allows models and views to be bound to each other. A separate mechanism is needed to bind a controller to one or more </a:t>
               </a:r>
+              <a:r>
+                <a:rPr lang="en-US" sz="1400" dirty="0" smtClean="0">
+                  <a:solidFill>
+                    <a:schemeClr val="bg1"/>
+                  </a:solidFill>
+                </a:rPr>
+                <a:t>models.</a:t>
+              </a:r>
+              <a:endParaRPr lang="en-US" sz="1400" dirty="0">
+                <a:solidFill>
+                  <a:schemeClr val="bg1"/>
+                </a:solidFill>
+              </a:endParaRPr>
             </a:p>
           </p:txBody>
         </p:sp>
@@ -16376,7 +16474,7 @@
           </p:nvSpPr>
           <p:spPr>
             <a:xfrm>
-              <a:off x="1564690" y="4286301"/>
+              <a:off x="1554762" y="4240961"/>
               <a:ext cx="2788648" cy="377562"/>
             </a:xfrm>
             <a:prstGeom prst="rect">
@@ -16565,14 +16663,14 @@
             </a:lstStyle>
             <a:p>
               <a:r>
-                <a:rPr lang="en-US" sz="2800" dirty="0" smtClean="0">
+                <a:rPr lang="en-US" sz="2800" b="1" dirty="0" smtClean="0">
                   <a:solidFill>
                     <a:schemeClr val="bg1"/>
                   </a:solidFill>
                 </a:rPr>
                 <a:t>Observer</a:t>
               </a:r>
-              <a:endParaRPr lang="en-US" sz="2800" dirty="0">
+              <a:endParaRPr lang="en-US" sz="2800" b="1" dirty="0">
                 <a:solidFill>
                   <a:schemeClr val="bg1"/>
                 </a:solidFill>
@@ -16654,7 +16752,7 @@
           </p:nvSpPr>
           <p:spPr>
             <a:xfrm>
-              <a:off x="1564690" y="4630091"/>
+              <a:off x="1564690" y="4589386"/>
               <a:ext cx="2576081" cy="903240"/>
             </a:xfrm>
             <a:prstGeom prst="rect">
@@ -16895,7 +16993,7 @@
           </p:nvSpPr>
           <p:spPr>
             <a:xfrm>
-              <a:off x="1564690" y="4270320"/>
+              <a:off x="1564690" y="4244527"/>
               <a:ext cx="2788648" cy="377562"/>
             </a:xfrm>
             <a:prstGeom prst="rect">
@@ -17084,13 +17182,26 @@
             </a:lstStyle>
             <a:p>
               <a:r>
-                <a:rPr lang="en-US" sz="2800" dirty="0">
+                <a:rPr lang="en-US" sz="2800" b="1" dirty="0">
                   <a:solidFill>
                     <a:schemeClr val="bg1"/>
                   </a:solidFill>
                 </a:rPr>
-                <a:t>repository</a:t>
+                <a:t>R</a:t>
               </a:r>
+              <a:r>
+                <a:rPr lang="en-US" sz="2800" b="1" dirty="0" smtClean="0">
+                  <a:solidFill>
+                    <a:schemeClr val="bg1"/>
+                  </a:solidFill>
+                </a:rPr>
+                <a:t>epository</a:t>
+              </a:r>
+              <a:endParaRPr lang="en-US" sz="2800" b="1" dirty="0">
+                <a:solidFill>
+                  <a:schemeClr val="bg1"/>
+                </a:solidFill>
+              </a:endParaRPr>
             </a:p>
           </p:txBody>
         </p:sp>
@@ -17099,6 +17210,123 @@
     <p:extLst>
       <p:ext uri="{BB962C8B-B14F-4D97-AF65-F5344CB8AC3E}">
         <p14:creationId xmlns:p14="http://schemas.microsoft.com/office/powerpoint/2010/main" val="665412060"/>
+      </p:ext>
+    </p:extLst>
+  </p:cSld>
+  <p:clrMapOvr>
+    <a:masterClrMapping/>
+  </p:clrMapOvr>
+  <mc:AlternateContent xmlns:mc="http://schemas.openxmlformats.org/markup-compatibility/2006" xmlns:p14="http://schemas.microsoft.com/office/powerpoint/2010/main">
+    <mc:Choice Requires="p14">
+      <p:transition spd="med" p14:dur="700">
+        <p:fade/>
+      </p:transition>
+    </mc:Choice>
+    <mc:Fallback xmlns="">
+      <p:transition spd="med">
+        <p:fade/>
+      </p:transition>
+    </mc:Fallback>
+  </mc:AlternateContent>
+  <p:timing>
+    <p:tnLst>
+      <p:par>
+        <p:cTn id="1" dur="indefinite" restart="never" nodeType="tmRoot"/>
+      </p:par>
+    </p:tnLst>
+  </p:timing>
+</p:sld>
+</file>
+
+<file path=ppt/slides/slide6.xml><?xml version="1.0" encoding="utf-8"?>
+<p:sld xmlns:a="http://schemas.openxmlformats.org/drawingml/2006/main" xmlns:r="http://schemas.openxmlformats.org/officeDocument/2006/relationships" xmlns:p="http://schemas.openxmlformats.org/presentationml/2006/main">
+  <p:cSld>
+    <p:spTree>
+      <p:nvGrpSpPr>
+        <p:cNvPr id="1" name=""/>
+        <p:cNvGrpSpPr/>
+        <p:nvPr/>
+      </p:nvGrpSpPr>
+      <p:grpSpPr>
+        <a:xfrm>
+          <a:off x="0" y="0"/>
+          <a:ext cx="0" cy="0"/>
+          <a:chOff x="0" y="0"/>
+          <a:chExt cx="0" cy="0"/>
+        </a:xfrm>
+      </p:grpSpPr>
+      <p:sp>
+        <p:nvSpPr>
+          <p:cNvPr id="2" name="文本占位符 1"/>
+          <p:cNvSpPr>
+            <a:spLocks noGrp="1"/>
+          </p:cNvSpPr>
+          <p:nvPr>
+            <p:ph type="body" sz="quarter" idx="10"/>
+          </p:nvPr>
+        </p:nvSpPr>
+        <p:spPr/>
+        <p:txBody>
+          <a:bodyPr/>
+          <a:lstStyle/>
+          <a:p>
+            <a:r>
+              <a:rPr lang="en-US" altLang="zh-CN" b="0" dirty="0"/>
+              <a:t>Architectural </a:t>
+            </a:r>
+            <a:r>
+              <a:rPr lang="en-US" altLang="zh-CN" b="0" dirty="0" smtClean="0"/>
+              <a:t>Patterns </a:t>
+            </a:r>
+            <a:endParaRPr kumimoji="1" lang="zh-CN" altLang="en-US" dirty="0"/>
+          </a:p>
+        </p:txBody>
+      </p:sp>
+      <p:pic>
+        <p:nvPicPr>
+          <p:cNvPr id="25" name="Picture 2" descr="Image result for mvc architecture"/>
+          <p:cNvPicPr>
+            <a:picLocks noChangeAspect="1" noChangeArrowheads="1"/>
+          </p:cNvPicPr>
+          <p:nvPr/>
+        </p:nvPicPr>
+        <p:blipFill>
+          <a:blip r:embed="rId3">
+            <a:extLst>
+              <a:ext uri="{28A0092B-C50C-407E-A947-70E740481C1C}">
+                <a14:useLocalDpi xmlns:a14="http://schemas.microsoft.com/office/drawing/2010/main" val="0"/>
+              </a:ext>
+            </a:extLst>
+          </a:blip>
+          <a:srcRect/>
+          <a:stretch>
+            <a:fillRect/>
+          </a:stretch>
+        </p:blipFill>
+        <p:spPr bwMode="auto">
+          <a:xfrm>
+            <a:off x="1522828" y="800101"/>
+            <a:ext cx="8447647" cy="5760248"/>
+          </a:xfrm>
+          <a:prstGeom prst="rect">
+            <a:avLst/>
+          </a:prstGeom>
+          <a:noFill/>
+          <a:extLst>
+            <a:ext uri="{909E8E84-426E-40DD-AFC4-6F175D3DCCD1}">
+              <a14:hiddenFill xmlns:a14="http://schemas.microsoft.com/office/drawing/2010/main">
+                <a:solidFill>
+                  <a:srgbClr val="FFFFFF"/>
+                </a:solidFill>
+              </a14:hiddenFill>
+            </a:ext>
+          </a:extLst>
+        </p:spPr>
+      </p:pic>
+    </p:spTree>
+    <p:extLst>
+      <p:ext uri="{BB962C8B-B14F-4D97-AF65-F5344CB8AC3E}">
+        <p14:creationId xmlns:p14="http://schemas.microsoft.com/office/powerpoint/2010/main" val="1129603816"/>
       </p:ext>
     </p:extLst>
   </p:cSld>
@@ -17154,57 +17382,68 @@
             <p:ph type="body" sz="quarter" idx="10"/>
           </p:nvPr>
         </p:nvSpPr>
-        <p:spPr>
-          <a:xfrm>
-            <a:off x="418245" y="232368"/>
-            <a:ext cx="5232209" cy="573404"/>
-          </a:xfrm>
-        </p:spPr>
+        <p:spPr/>
         <p:txBody>
           <a:bodyPr/>
           <a:lstStyle/>
           <a:p>
             <a:r>
-              <a:rPr lang="en-US" b="0" dirty="0" smtClean="0"/>
-              <a:t>Design Pattern</a:t>
+              <a:rPr lang="en-US" altLang="zh-CN" b="0" dirty="0"/>
+              <a:t>Architectural </a:t>
+            </a:r>
+            <a:r>
+              <a:rPr lang="en-US" altLang="zh-CN" b="0" dirty="0" smtClean="0"/>
+              <a:t>Patterns </a:t>
             </a:r>
             <a:endParaRPr kumimoji="1" lang="zh-CN" altLang="en-US" dirty="0"/>
           </a:p>
         </p:txBody>
       </p:sp>
-      <p:sp>
-        <p:nvSpPr>
-          <p:cNvPr id="15" name="矩形 14"/>
-          <p:cNvSpPr/>
+      <p:pic>
+        <p:nvPicPr>
+          <p:cNvPr id="26" name="Picture 4" descr="Image result for restful api"/>
+          <p:cNvPicPr>
+            <a:picLocks noChangeAspect="1" noChangeArrowheads="1"/>
+          </p:cNvPicPr>
           <p:nvPr/>
-        </p:nvSpPr>
-        <p:spPr>
+        </p:nvPicPr>
+        <p:blipFill>
+          <a:blip r:embed="rId3">
+            <a:extLst>
+              <a:ext uri="{28A0092B-C50C-407E-A947-70E740481C1C}">
+                <a14:useLocalDpi xmlns:a14="http://schemas.microsoft.com/office/drawing/2010/main" val="0"/>
+              </a:ext>
+            </a:extLst>
+          </a:blip>
+          <a:srcRect/>
+          <a:stretch>
+            <a:fillRect/>
+          </a:stretch>
+        </p:blipFill>
+        <p:spPr bwMode="auto">
           <a:xfrm>
-            <a:off x="617220" y="1211961"/>
-            <a:ext cx="4162358" cy="830997"/>
+            <a:off x="1662125" y="1469260"/>
+            <a:ext cx="9275358" cy="4069893"/>
           </a:xfrm>
           <a:prstGeom prst="rect">
             <a:avLst/>
           </a:prstGeom>
+          <a:noFill/>
+          <a:extLst>
+            <a:ext uri="{909E8E84-426E-40DD-AFC4-6F175D3DCCD1}">
+              <a14:hiddenFill xmlns:a14="http://schemas.microsoft.com/office/drawing/2010/main">
+                <a:solidFill>
+                  <a:srgbClr val="FFFFFF"/>
+                </a:solidFill>
+              </a14:hiddenFill>
+            </a:ext>
+          </a:extLst>
         </p:spPr>
-        <p:txBody>
-          <a:bodyPr wrap="square">
-            <a:spAutoFit/>
-          </a:bodyPr>
-          <a:lstStyle/>
-          <a:p>
-            <a:r>
-              <a:rPr lang="en-US" sz="2400"/>
-              <a:t>focus on a particular design pattern or two,</a:t>
-            </a:r>
-            <a:endParaRPr lang="en-US" sz="2400" dirty="0"/>
-          </a:p>
-        </p:txBody>
-      </p:sp>
+      </p:pic>
     </p:spTree>
     <p:extLst>
       <p:ext uri="{BB962C8B-B14F-4D97-AF65-F5344CB8AC3E}">
-        <p14:creationId xmlns:p14="http://schemas.microsoft.com/office/powerpoint/2010/main" val="1305460958"/>
+        <p14:creationId xmlns:p14="http://schemas.microsoft.com/office/powerpoint/2010/main" val="1116175289"/>
       </p:ext>
     </p:extLst>
   </p:cSld>

</xml_diff>